<commit_message>
images for github Readme
</commit_message>
<xml_diff>
--- a/wireframes/wireframes.pptx
+++ b/wireframes/wireframes.pptx
@@ -268,7 +268,7 @@
           <a:p>
             <a:fld id="{CE5C1B82-FF87-5E43-9112-610624864079}" type="datetimeFigureOut">
               <a:rPr lang="en-US" smtClean="0"/>
-              <a:t>7/13/20</a:t>
+              <a:t>9/14/20</a:t>
             </a:fld>
             <a:endParaRPr lang="en-US"/>
           </a:p>
@@ -466,7 +466,7 @@
           <a:p>
             <a:fld id="{CE5C1B82-FF87-5E43-9112-610624864079}" type="datetimeFigureOut">
               <a:rPr lang="en-US" smtClean="0"/>
-              <a:t>7/13/20</a:t>
+              <a:t>9/14/20</a:t>
             </a:fld>
             <a:endParaRPr lang="en-US"/>
           </a:p>
@@ -674,7 +674,7 @@
           <a:p>
             <a:fld id="{CE5C1B82-FF87-5E43-9112-610624864079}" type="datetimeFigureOut">
               <a:rPr lang="en-US" smtClean="0"/>
-              <a:t>7/13/20</a:t>
+              <a:t>9/14/20</a:t>
             </a:fld>
             <a:endParaRPr lang="en-US"/>
           </a:p>
@@ -872,7 +872,7 @@
           <a:p>
             <a:fld id="{CE5C1B82-FF87-5E43-9112-610624864079}" type="datetimeFigureOut">
               <a:rPr lang="en-US" smtClean="0"/>
-              <a:t>7/13/20</a:t>
+              <a:t>9/14/20</a:t>
             </a:fld>
             <a:endParaRPr lang="en-US"/>
           </a:p>
@@ -1147,7 +1147,7 @@
           <a:p>
             <a:fld id="{CE5C1B82-FF87-5E43-9112-610624864079}" type="datetimeFigureOut">
               <a:rPr lang="en-US" smtClean="0"/>
-              <a:t>7/13/20</a:t>
+              <a:t>9/14/20</a:t>
             </a:fld>
             <a:endParaRPr lang="en-US"/>
           </a:p>
@@ -1412,7 +1412,7 @@
           <a:p>
             <a:fld id="{CE5C1B82-FF87-5E43-9112-610624864079}" type="datetimeFigureOut">
               <a:rPr lang="en-US" smtClean="0"/>
-              <a:t>7/13/20</a:t>
+              <a:t>9/14/20</a:t>
             </a:fld>
             <a:endParaRPr lang="en-US"/>
           </a:p>
@@ -1824,7 +1824,7 @@
           <a:p>
             <a:fld id="{CE5C1B82-FF87-5E43-9112-610624864079}" type="datetimeFigureOut">
               <a:rPr lang="en-US" smtClean="0"/>
-              <a:t>7/13/20</a:t>
+              <a:t>9/14/20</a:t>
             </a:fld>
             <a:endParaRPr lang="en-US"/>
           </a:p>
@@ -1965,7 +1965,7 @@
           <a:p>
             <a:fld id="{CE5C1B82-FF87-5E43-9112-610624864079}" type="datetimeFigureOut">
               <a:rPr lang="en-US" smtClean="0"/>
-              <a:t>7/13/20</a:t>
+              <a:t>9/14/20</a:t>
             </a:fld>
             <a:endParaRPr lang="en-US"/>
           </a:p>
@@ -2078,7 +2078,7 @@
           <a:p>
             <a:fld id="{CE5C1B82-FF87-5E43-9112-610624864079}" type="datetimeFigureOut">
               <a:rPr lang="en-US" smtClean="0"/>
-              <a:t>7/13/20</a:t>
+              <a:t>9/14/20</a:t>
             </a:fld>
             <a:endParaRPr lang="en-US"/>
           </a:p>
@@ -2389,7 +2389,7 @@
           <a:p>
             <a:fld id="{CE5C1B82-FF87-5E43-9112-610624864079}" type="datetimeFigureOut">
               <a:rPr lang="en-US" smtClean="0"/>
-              <a:t>7/13/20</a:t>
+              <a:t>9/14/20</a:t>
             </a:fld>
             <a:endParaRPr lang="en-US"/>
           </a:p>
@@ -2677,7 +2677,7 @@
           <a:p>
             <a:fld id="{CE5C1B82-FF87-5E43-9112-610624864079}" type="datetimeFigureOut">
               <a:rPr lang="en-US" smtClean="0"/>
-              <a:t>7/13/20</a:t>
+              <a:t>9/14/20</a:t>
             </a:fld>
             <a:endParaRPr lang="en-US"/>
           </a:p>
@@ -2918,7 +2918,7 @@
           <a:p>
             <a:fld id="{CE5C1B82-FF87-5E43-9112-610624864079}" type="datetimeFigureOut">
               <a:rPr lang="en-US" smtClean="0"/>
-              <a:t>7/13/20</a:t>
+              <a:t>9/14/20</a:t>
             </a:fld>
             <a:endParaRPr lang="en-US"/>
           </a:p>
@@ -4599,7 +4599,7 @@
         <p:spPr>
           <a:xfrm>
             <a:off x="88620" y="1220761"/>
-            <a:ext cx="3058271" cy="584775"/>
+            <a:ext cx="3058271" cy="523220"/>
           </a:xfrm>
           <a:prstGeom prst="rect">
             <a:avLst/>
@@ -4615,7 +4615,7 @@
           <a:lstStyle/>
           <a:p>
             <a:r>
-              <a:rPr lang="en-US" sz="3200" dirty="0">
+              <a:rPr lang="en-US" sz="2800" dirty="0">
                 <a:solidFill>
                   <a:schemeClr val="bg1"/>
                 </a:solidFill>
@@ -4623,7 +4623,7 @@
               <a:t>/</a:t>
             </a:r>
             <a:r>
-              <a:rPr lang="en-US" sz="3200" dirty="0" err="1">
+              <a:rPr lang="en-US" sz="2800" dirty="0" err="1">
                 <a:solidFill>
                   <a:schemeClr val="bg1"/>
                 </a:solidFill>
@@ -4631,7 +4631,7 @@
               <a:t>api</a:t>
             </a:r>
             <a:r>
-              <a:rPr lang="en-US" sz="3200" dirty="0">
+              <a:rPr lang="en-US" sz="2800" dirty="0">
                 <a:solidFill>
                   <a:schemeClr val="bg1"/>
                 </a:solidFill>
@@ -4656,7 +4656,7 @@
         <p:spPr>
           <a:xfrm>
             <a:off x="88615" y="3611407"/>
-            <a:ext cx="3058272" cy="584775"/>
+            <a:ext cx="3058272" cy="523220"/>
           </a:xfrm>
           <a:prstGeom prst="rect">
             <a:avLst/>
@@ -4672,7 +4672,7 @@
           <a:lstStyle/>
           <a:p>
             <a:r>
-              <a:rPr lang="en-US" sz="3200" dirty="0">
+              <a:rPr lang="en-US" sz="2800" dirty="0">
                 <a:solidFill>
                   <a:schemeClr val="bg1"/>
                 </a:solidFill>
@@ -4697,7 +4697,7 @@
         <p:spPr>
           <a:xfrm>
             <a:off x="88618" y="4163398"/>
-            <a:ext cx="3058273" cy="1077218"/>
+            <a:ext cx="3058273" cy="954107"/>
           </a:xfrm>
           <a:prstGeom prst="rect">
             <a:avLst/>
@@ -4713,7 +4713,7 @@
           <a:lstStyle/>
           <a:p>
             <a:r>
-              <a:rPr lang="en-US" sz="3200" dirty="0"/>
+              <a:rPr lang="en-US" sz="2800" dirty="0"/>
               <a:t>Create new user + log user in</a:t>
             </a:r>
           </a:p>
@@ -4734,7 +4734,7 @@
         <p:spPr>
           <a:xfrm>
             <a:off x="88619" y="5500219"/>
-            <a:ext cx="3058272" cy="584775"/>
+            <a:ext cx="3058272" cy="523220"/>
           </a:xfrm>
           <a:prstGeom prst="rect">
             <a:avLst/>
@@ -4750,7 +4750,7 @@
           <a:lstStyle/>
           <a:p>
             <a:r>
-              <a:rPr lang="en-US" sz="3200" dirty="0">
+              <a:rPr lang="en-US" sz="2800" dirty="0">
                 <a:solidFill>
                   <a:schemeClr val="bg1"/>
                 </a:solidFill>
@@ -4775,7 +4775,7 @@
         <p:spPr>
           <a:xfrm>
             <a:off x="88618" y="6084994"/>
-            <a:ext cx="3058273" cy="584775"/>
+            <a:ext cx="3058273" cy="523220"/>
           </a:xfrm>
           <a:prstGeom prst="rect">
             <a:avLst/>
@@ -4791,7 +4791,7 @@
           <a:lstStyle/>
           <a:p>
             <a:r>
-              <a:rPr lang="en-US" sz="3200" dirty="0"/>
+              <a:rPr lang="en-US" sz="2800" dirty="0"/>
               <a:t>Log user in</a:t>
             </a:r>
           </a:p>
@@ -4812,7 +4812,7 @@
         <p:spPr>
           <a:xfrm>
             <a:off x="3277587" y="1220761"/>
-            <a:ext cx="8329455" cy="584775"/>
+            <a:ext cx="8329455" cy="523220"/>
           </a:xfrm>
           <a:prstGeom prst="rect">
             <a:avLst/>
@@ -4828,7 +4828,7 @@
           <a:lstStyle/>
           <a:p>
             <a:r>
-              <a:rPr lang="en-US" sz="3200" dirty="0">
+              <a:rPr lang="en-US" sz="2800" dirty="0">
                 <a:solidFill>
                   <a:schemeClr val="bg1"/>
                 </a:solidFill>
@@ -4836,7 +4836,7 @@
               <a:t>/</a:t>
             </a:r>
             <a:r>
-              <a:rPr lang="en-US" sz="3200" dirty="0" err="1">
+              <a:rPr lang="en-US" sz="2800" dirty="0" err="1">
                 <a:solidFill>
                   <a:schemeClr val="bg1"/>
                 </a:solidFill>
@@ -4844,7 +4844,7 @@
               <a:t>api</a:t>
             </a:r>
             <a:r>
-              <a:rPr lang="en-US" sz="3200" dirty="0">
+              <a:rPr lang="en-US" sz="2800" dirty="0">
                 <a:solidFill>
                   <a:schemeClr val="bg1"/>
                 </a:solidFill>
@@ -4869,7 +4869,7 @@
         <p:spPr>
           <a:xfrm>
             <a:off x="3277586" y="2065139"/>
-            <a:ext cx="4099381" cy="584775"/>
+            <a:ext cx="4099381" cy="523220"/>
           </a:xfrm>
           <a:prstGeom prst="rect">
             <a:avLst/>
@@ -4885,7 +4885,7 @@
           <a:lstStyle/>
           <a:p>
             <a:r>
-              <a:rPr lang="en-US" sz="3200" dirty="0">
+              <a:rPr lang="en-US" sz="2800" dirty="0">
                 <a:solidFill>
                   <a:schemeClr val="bg1"/>
                 </a:solidFill>
@@ -4910,7 +4910,7 @@
         <p:spPr>
           <a:xfrm>
             <a:off x="3277586" y="2649914"/>
-            <a:ext cx="4099382" cy="1077218"/>
+            <a:ext cx="4099382" cy="954107"/>
           </a:xfrm>
           <a:prstGeom prst="rect">
             <a:avLst/>
@@ -4929,14 +4929,14 @@
           <a:lstStyle/>
           <a:p>
             <a:r>
-              <a:rPr lang="en-US" sz="3200" dirty="0"/>
+              <a:rPr lang="en-US" sz="2800" dirty="0"/>
               <a:t>Retrieve a list of all </a:t>
             </a:r>
             <a:r>
-              <a:rPr lang="en-US" sz="3200" dirty="0" err="1"/>
+              <a:rPr lang="en-US" sz="2800" dirty="0" err="1"/>
               <a:t>foodgroups</a:t>
             </a:r>
-            <a:endParaRPr lang="en-US" sz="3200" dirty="0"/>
+            <a:endParaRPr lang="en-US" sz="2800" dirty="0"/>
           </a:p>
         </p:txBody>
       </p:sp>
@@ -4955,7 +4955,7 @@
         <p:spPr>
           <a:xfrm>
             <a:off x="3277587" y="3986735"/>
-            <a:ext cx="4099383" cy="584775"/>
+            <a:ext cx="4099383" cy="523220"/>
           </a:xfrm>
           <a:prstGeom prst="rect">
             <a:avLst/>
@@ -4971,7 +4971,7 @@
           <a:lstStyle/>
           <a:p>
             <a:r>
-              <a:rPr lang="en-US" sz="3200" dirty="0">
+              <a:rPr lang="en-US" sz="2800" dirty="0">
                 <a:solidFill>
                   <a:schemeClr val="bg1"/>
                 </a:solidFill>
@@ -4979,7 +4979,7 @@
               <a:t>GET /</a:t>
             </a:r>
             <a:r>
-              <a:rPr lang="en-US" sz="3200" dirty="0" err="1">
+              <a:rPr lang="en-US" sz="2800" dirty="0" err="1">
                 <a:solidFill>
                   <a:schemeClr val="bg1"/>
                 </a:solidFill>
@@ -4987,7 +4987,7 @@
               <a:t>api</a:t>
             </a:r>
             <a:r>
-              <a:rPr lang="en-US" sz="3200" dirty="0">
+              <a:rPr lang="en-US" sz="2800" dirty="0">
                 <a:solidFill>
                   <a:schemeClr val="bg1"/>
                 </a:solidFill>
@@ -4995,7 +4995,7 @@
               <a:t>/</a:t>
             </a:r>
             <a:r>
-              <a:rPr lang="en-US" sz="3200" dirty="0" err="1">
+              <a:rPr lang="en-US" sz="2800" dirty="0" err="1">
                 <a:solidFill>
                   <a:schemeClr val="bg1"/>
                 </a:solidFill>
@@ -5003,7 +5003,7 @@
               <a:t>foodgroups</a:t>
             </a:r>
             <a:r>
-              <a:rPr lang="en-US" sz="3200" dirty="0">
+              <a:rPr lang="en-US" sz="2800" dirty="0">
                 <a:solidFill>
                   <a:schemeClr val="bg1"/>
                 </a:solidFill>
@@ -5028,7 +5028,7 @@
         <p:spPr>
           <a:xfrm>
             <a:off x="3277587" y="4571510"/>
-            <a:ext cx="4099383" cy="1077218"/>
+            <a:ext cx="4099383" cy="954107"/>
           </a:xfrm>
           <a:prstGeom prst="rect">
             <a:avLst/>
@@ -5047,14 +5047,14 @@
           <a:lstStyle/>
           <a:p>
             <a:r>
-              <a:rPr lang="en-US" sz="3200" dirty="0"/>
+              <a:rPr lang="en-US" sz="2800" dirty="0"/>
               <a:t>Retrieve list of all foods for a given </a:t>
             </a:r>
             <a:r>
-              <a:rPr lang="en-US" sz="3200" dirty="0" err="1"/>
+              <a:rPr lang="en-US" sz="2800" dirty="0" err="1"/>
               <a:t>foodgroup</a:t>
             </a:r>
-            <a:endParaRPr lang="en-US" sz="3200" dirty="0"/>
+            <a:endParaRPr lang="en-US" sz="2800" dirty="0"/>
           </a:p>
         </p:txBody>
       </p:sp>
@@ -5072,8 +5072,8 @@
         </p:nvSpPr>
         <p:spPr>
           <a:xfrm>
-            <a:off x="7507662" y="2065139"/>
-            <a:ext cx="4099381" cy="584775"/>
+            <a:off x="7507662" y="1886469"/>
+            <a:ext cx="4099381" cy="523220"/>
           </a:xfrm>
           <a:prstGeom prst="rect">
             <a:avLst/>
@@ -5089,7 +5089,7 @@
           <a:lstStyle/>
           <a:p>
             <a:r>
-              <a:rPr lang="en-US" sz="3200" dirty="0">
+              <a:rPr lang="en-US" sz="2800" dirty="0">
                 <a:solidFill>
                   <a:schemeClr val="bg1"/>
                 </a:solidFill>
@@ -5097,7 +5097,7 @@
               <a:t>POST ./</a:t>
             </a:r>
             <a:r>
-              <a:rPr lang="en-US" sz="3200" dirty="0" err="1">
+              <a:rPr lang="en-US" sz="2800" dirty="0" err="1">
                 <a:solidFill>
                   <a:schemeClr val="bg1"/>
                 </a:solidFill>
@@ -5105,7 +5105,7 @@
               <a:t>api</a:t>
             </a:r>
             <a:r>
-              <a:rPr lang="en-US" sz="3200" dirty="0">
+              <a:rPr lang="en-US" sz="2800" dirty="0">
                 <a:solidFill>
                   <a:schemeClr val="bg1"/>
                 </a:solidFill>
@@ -5113,7 +5113,7 @@
               <a:t>/</a:t>
             </a:r>
             <a:r>
-              <a:rPr lang="en-US" sz="3200" dirty="0" err="1">
+              <a:rPr lang="en-US" sz="2800" dirty="0" err="1">
                 <a:solidFill>
                   <a:schemeClr val="bg1"/>
                 </a:solidFill>
@@ -5121,7 +5121,7 @@
               <a:t>foodgroups</a:t>
             </a:r>
             <a:r>
-              <a:rPr lang="en-US" sz="3200" dirty="0">
+              <a:rPr lang="en-US" sz="2800" dirty="0">
                 <a:solidFill>
                   <a:schemeClr val="bg1"/>
                 </a:solidFill>
@@ -5145,8 +5145,8 @@
         </p:nvSpPr>
         <p:spPr>
           <a:xfrm>
-            <a:off x="7507662" y="2649914"/>
-            <a:ext cx="4099382" cy="1077218"/>
+            <a:off x="7507653" y="2465823"/>
+            <a:ext cx="4099382" cy="523220"/>
           </a:xfrm>
           <a:prstGeom prst="rect">
             <a:avLst/>
@@ -5165,14 +5165,14 @@
           <a:lstStyle/>
           <a:p>
             <a:r>
-              <a:rPr lang="en-US" sz="3200" dirty="0"/>
+              <a:rPr lang="en-US" sz="2800" dirty="0"/>
               <a:t>Create a new </a:t>
             </a:r>
             <a:r>
-              <a:rPr lang="en-US" sz="3200" dirty="0" err="1"/>
+              <a:rPr lang="en-US" sz="2800" dirty="0" err="1"/>
               <a:t>foodgroup</a:t>
             </a:r>
-            <a:endParaRPr lang="en-US" sz="3200" dirty="0"/>
+            <a:endParaRPr lang="en-US" sz="2800" dirty="0"/>
           </a:p>
         </p:txBody>
       </p:sp>
@@ -5190,8 +5190,8 @@
         </p:nvSpPr>
         <p:spPr>
           <a:xfrm>
-            <a:off x="7507657" y="5042031"/>
-            <a:ext cx="4099383" cy="1077218"/>
+            <a:off x="7507653" y="4715388"/>
+            <a:ext cx="4099383" cy="954107"/>
           </a:xfrm>
           <a:prstGeom prst="rect">
             <a:avLst/>
@@ -5207,7 +5207,7 @@
           <a:lstStyle/>
           <a:p>
             <a:r>
-              <a:rPr lang="en-US" sz="3200" dirty="0">
+              <a:rPr lang="en-US" sz="2800" dirty="0">
                 <a:solidFill>
                   <a:schemeClr val="bg1"/>
                 </a:solidFill>
@@ -5215,7 +5215,7 @@
               <a:t>PATCH ../:</a:t>
             </a:r>
             <a:r>
-              <a:rPr lang="en-US" sz="3200" dirty="0" err="1">
+              <a:rPr lang="en-US" sz="2800" dirty="0" err="1">
                 <a:solidFill>
                   <a:schemeClr val="bg1"/>
                 </a:solidFill>
@@ -5223,7 +5223,7 @@
               <a:t>foodname</a:t>
             </a:r>
             <a:r>
-              <a:rPr lang="en-US" sz="3200" dirty="0">
+              <a:rPr lang="en-US" sz="2800" dirty="0">
                 <a:solidFill>
                   <a:schemeClr val="bg1"/>
                 </a:solidFill>
@@ -5231,14 +5231,14 @@
               <a:t> ../food/:</a:t>
             </a:r>
             <a:r>
-              <a:rPr lang="en-US" sz="3200" dirty="0" err="1">
+              <a:rPr lang="en-US" sz="2800" dirty="0" err="1">
                 <a:solidFill>
                   <a:schemeClr val="bg1"/>
                 </a:solidFill>
               </a:rPr>
               <a:t>foodgroup</a:t>
             </a:r>
-            <a:endParaRPr lang="en-US" sz="3200" dirty="0">
+            <a:endParaRPr lang="en-US" sz="2800" dirty="0">
               <a:solidFill>
                 <a:schemeClr val="bg1"/>
               </a:solidFill>
@@ -5260,8 +5260,8 @@
         </p:nvSpPr>
         <p:spPr>
           <a:xfrm>
-            <a:off x="7507658" y="5792606"/>
-            <a:ext cx="4099383" cy="1077218"/>
+            <a:off x="7507653" y="5731861"/>
+            <a:ext cx="4099383" cy="954107"/>
           </a:xfrm>
           <a:prstGeom prst="rect">
             <a:avLst/>
@@ -5280,7 +5280,7 @@
           <a:lstStyle/>
           <a:p>
             <a:r>
-              <a:rPr lang="en-US" sz="3200" dirty="0"/>
+              <a:rPr lang="en-US" sz="2800" dirty="0"/>
               <a:t>Edit existing food item for a specific food item</a:t>
             </a:r>
           </a:p>
@@ -5300,8 +5300,8 @@
         </p:nvSpPr>
         <p:spPr>
           <a:xfrm>
-            <a:off x="7507654" y="3625940"/>
-            <a:ext cx="4099381" cy="584775"/>
+            <a:off x="7507653" y="3103182"/>
+            <a:ext cx="4099381" cy="523220"/>
           </a:xfrm>
           <a:prstGeom prst="rect">
             <a:avLst/>
@@ -5317,7 +5317,7 @@
           <a:lstStyle/>
           <a:p>
             <a:r>
-              <a:rPr lang="en-US" sz="3200" dirty="0">
+              <a:rPr lang="en-US" sz="2800" dirty="0">
                 <a:solidFill>
                   <a:schemeClr val="bg1"/>
                 </a:solidFill>
@@ -5325,14 +5325,14 @@
               <a:t>GET ../:</a:t>
             </a:r>
             <a:r>
-              <a:rPr lang="en-US" sz="3200" dirty="0" err="1">
+              <a:rPr lang="en-US" sz="2800" dirty="0" err="1">
                 <a:solidFill>
                   <a:schemeClr val="bg1"/>
                 </a:solidFill>
               </a:rPr>
               <a:t>foodname</a:t>
             </a:r>
-            <a:endParaRPr lang="en-US" sz="3200" dirty="0">
+            <a:endParaRPr lang="en-US" sz="2800" dirty="0">
               <a:solidFill>
                 <a:schemeClr val="bg1"/>
               </a:solidFill>
@@ -5354,8 +5354,8 @@
         </p:nvSpPr>
         <p:spPr>
           <a:xfrm>
-            <a:off x="7507653" y="4016474"/>
-            <a:ext cx="4099382" cy="1077218"/>
+            <a:off x="7507653" y="3698915"/>
+            <a:ext cx="4099382" cy="954107"/>
           </a:xfrm>
           <a:prstGeom prst="rect">
             <a:avLst/>
@@ -5374,7 +5374,7 @@
           <a:lstStyle/>
           <a:p>
             <a:r>
-              <a:rPr lang="en-US" sz="3200" dirty="0"/>
+              <a:rPr lang="en-US" sz="2800" dirty="0"/>
               <a:t>Retrieve details of a food item</a:t>
             </a:r>
           </a:p>
@@ -5395,7 +5395,7 @@
         <p:spPr>
           <a:xfrm>
             <a:off x="88616" y="1851669"/>
-            <a:ext cx="3058272" cy="584775"/>
+            <a:ext cx="3058272" cy="523220"/>
           </a:xfrm>
           <a:prstGeom prst="rect">
             <a:avLst/>
@@ -5411,7 +5411,7 @@
           <a:lstStyle/>
           <a:p>
             <a:r>
-              <a:rPr lang="en-US" sz="3200" dirty="0">
+              <a:rPr lang="en-US" sz="2800" dirty="0">
                 <a:solidFill>
                   <a:schemeClr val="bg1"/>
                 </a:solidFill>
@@ -5436,7 +5436,7 @@
         <p:spPr>
           <a:xfrm>
             <a:off x="88615" y="2436444"/>
-            <a:ext cx="3058273" cy="1077218"/>
+            <a:ext cx="3058273" cy="954107"/>
           </a:xfrm>
           <a:prstGeom prst="rect">
             <a:avLst/>
@@ -5452,11 +5452,11 @@
           <a:lstStyle/>
           <a:p>
             <a:r>
-              <a:rPr lang="en-US" sz="3200" dirty="0" err="1"/>
+              <a:rPr lang="en-US" sz="2800" dirty="0" err="1"/>
               <a:t>Retreive</a:t>
             </a:r>
             <a:r>
-              <a:rPr lang="en-US" sz="3200" dirty="0"/>
+              <a:rPr lang="en-US" sz="2800" dirty="0"/>
               <a:t> list of all users</a:t>
             </a:r>
           </a:p>
@@ -6902,7 +6902,7 @@
         </p:nvSpPr>
         <p:spPr>
           <a:xfrm>
-            <a:off x="3950630" y="4401624"/>
+            <a:off x="4139816" y="4662792"/>
             <a:ext cx="4427174" cy="369332"/>
           </a:xfrm>
           <a:prstGeom prst="rect">

</xml_diff>